<commit_message>
pptx ria removed logged check in index
manca da togliele il controllo nella onePage
</commit_message>
<xml_diff>
--- a/Presentazioni Powerpoint/Progetto1_versione_PURE_HTML.pptx
+++ b/Presentazioni Powerpoint/Progetto1_versione_PURE_HTML.pptx
@@ -200,7 +200,7 @@
           <a:p>
             <a:fld id="{C25F5A86-D4B2-4CFB-9FC8-FAE097577B12}" type="datetimeFigureOut">
               <a:rPr lang="it-IT" smtClean="0"/>
-              <a:t>21/08/2020</a:t>
+              <a:t>05/09/2020</a:t>
             </a:fld>
             <a:endParaRPr lang="it-IT"/>
           </a:p>
@@ -802,7 +802,7 @@
           <a:p>
             <a:fld id="{FE1EE28F-F736-456D-A3C7-4F5EC37410C2}" type="datetimeFigureOut">
               <a:rPr lang="it-IT" smtClean="0"/>
-              <a:t>21/08/2020</a:t>
+              <a:t>05/09/2020</a:t>
             </a:fld>
             <a:endParaRPr lang="it-IT"/>
           </a:p>
@@ -1000,7 +1000,7 @@
           <a:p>
             <a:fld id="{FE1EE28F-F736-456D-A3C7-4F5EC37410C2}" type="datetimeFigureOut">
               <a:rPr lang="it-IT" smtClean="0"/>
-              <a:t>21/08/2020</a:t>
+              <a:t>05/09/2020</a:t>
             </a:fld>
             <a:endParaRPr lang="it-IT"/>
           </a:p>
@@ -1208,7 +1208,7 @@
           <a:p>
             <a:fld id="{FE1EE28F-F736-456D-A3C7-4F5EC37410C2}" type="datetimeFigureOut">
               <a:rPr lang="it-IT" smtClean="0"/>
-              <a:t>21/08/2020</a:t>
+              <a:t>05/09/2020</a:t>
             </a:fld>
             <a:endParaRPr lang="it-IT"/>
           </a:p>
@@ -1406,7 +1406,7 @@
           <a:p>
             <a:fld id="{FE1EE28F-F736-456D-A3C7-4F5EC37410C2}" type="datetimeFigureOut">
               <a:rPr lang="it-IT" smtClean="0"/>
-              <a:t>21/08/2020</a:t>
+              <a:t>05/09/2020</a:t>
             </a:fld>
             <a:endParaRPr lang="it-IT"/>
           </a:p>
@@ -1681,7 +1681,7 @@
           <a:p>
             <a:fld id="{FE1EE28F-F736-456D-A3C7-4F5EC37410C2}" type="datetimeFigureOut">
               <a:rPr lang="it-IT" smtClean="0"/>
-              <a:t>21/08/2020</a:t>
+              <a:t>05/09/2020</a:t>
             </a:fld>
             <a:endParaRPr lang="it-IT"/>
           </a:p>
@@ -1946,7 +1946,7 @@
           <a:p>
             <a:fld id="{FE1EE28F-F736-456D-A3C7-4F5EC37410C2}" type="datetimeFigureOut">
               <a:rPr lang="it-IT" smtClean="0"/>
-              <a:t>21/08/2020</a:t>
+              <a:t>05/09/2020</a:t>
             </a:fld>
             <a:endParaRPr lang="it-IT"/>
           </a:p>
@@ -2358,7 +2358,7 @@
           <a:p>
             <a:fld id="{FE1EE28F-F736-456D-A3C7-4F5EC37410C2}" type="datetimeFigureOut">
               <a:rPr lang="it-IT" smtClean="0"/>
-              <a:t>21/08/2020</a:t>
+              <a:t>05/09/2020</a:t>
             </a:fld>
             <a:endParaRPr lang="it-IT"/>
           </a:p>
@@ -2499,7 +2499,7 @@
           <a:p>
             <a:fld id="{FE1EE28F-F736-456D-A3C7-4F5EC37410C2}" type="datetimeFigureOut">
               <a:rPr lang="it-IT" smtClean="0"/>
-              <a:t>21/08/2020</a:t>
+              <a:t>05/09/2020</a:t>
             </a:fld>
             <a:endParaRPr lang="it-IT"/>
           </a:p>
@@ -2612,7 +2612,7 @@
           <a:p>
             <a:fld id="{FE1EE28F-F736-456D-A3C7-4F5EC37410C2}" type="datetimeFigureOut">
               <a:rPr lang="it-IT" smtClean="0"/>
-              <a:t>21/08/2020</a:t>
+              <a:t>05/09/2020</a:t>
             </a:fld>
             <a:endParaRPr lang="it-IT"/>
           </a:p>
@@ -2923,7 +2923,7 @@
           <a:p>
             <a:fld id="{FE1EE28F-F736-456D-A3C7-4F5EC37410C2}" type="datetimeFigureOut">
               <a:rPr lang="it-IT" smtClean="0"/>
-              <a:t>21/08/2020</a:t>
+              <a:t>05/09/2020</a:t>
             </a:fld>
             <a:endParaRPr lang="it-IT"/>
           </a:p>
@@ -3211,7 +3211,7 @@
           <a:p>
             <a:fld id="{FE1EE28F-F736-456D-A3C7-4F5EC37410C2}" type="datetimeFigureOut">
               <a:rPr lang="it-IT" smtClean="0"/>
-              <a:t>21/08/2020</a:t>
+              <a:t>05/09/2020</a:t>
             </a:fld>
             <a:endParaRPr lang="it-IT"/>
           </a:p>
@@ -3452,7 +3452,7 @@
           <a:p>
             <a:fld id="{FE1EE28F-F736-456D-A3C7-4F5EC37410C2}" type="datetimeFigureOut">
               <a:rPr lang="it-IT" smtClean="0"/>
-              <a:t>21/08/2020</a:t>
+              <a:t>05/09/2020</a:t>
             </a:fld>
             <a:endParaRPr lang="it-IT"/>
           </a:p>
@@ -6471,7 +6471,7 @@
                 <a:cs typeface="Calibri"/>
                 <a:sym typeface="Calibri"/>
               </a:rPr>
-              <a:t>[text comment, date]</a:t>
+              <a:t>[text comment]</a:t>
             </a:r>
           </a:p>
           <a:p>

</xml_diff>

<commit_message>
sistemazione delle presentazioni e modifica codice javascript per la gestione dell'image details
</commit_message>
<xml_diff>
--- a/Presentazioni Powerpoint/Progetto1_versione_PURE_HTML.pptx
+++ b/Presentazioni Powerpoint/Progetto1_versione_PURE_HTML.pptx
@@ -4051,58 +4051,66 @@
           </a:p>
           <a:p>
             <a:r>
+              <a:rPr lang="en-US" sz="1600" dirty="0"/>
+              <a:t>AlbumId</a:t>
+            </a:r>
+            <a:r>
               <a:rPr lang="en-US" sz="1600" dirty="0">
                 <a:solidFill>
                   <a:srgbClr val="FF0000"/>
                 </a:solidFill>
               </a:rPr>
-              <a:t>AlbumId </a:t>
+              <a:t> </a:t>
             </a:r>
             <a:r>
               <a:rPr lang="en-US" sz="1600" dirty="0">
+                <a:sym typeface="Wingdings" panose="05000000000000000000" pitchFamily="2" charset="2"/>
+              </a:rPr>
+              <a:t></a:t>
+            </a:r>
+            <a:r>
+              <a:rPr lang="en-US" sz="1600" dirty="0">
                 <a:solidFill>
                   <a:srgbClr val="FF0000"/>
                 </a:solidFill>
                 <a:sym typeface="Wingdings" panose="05000000000000000000" pitchFamily="2" charset="2"/>
               </a:rPr>
-              <a:t> alId</a:t>
-            </a:r>
-          </a:p>
-          <a:p>
-            <a:r>
-              <a:rPr lang="it-IT" sz="1600" dirty="0">
+              <a:t> </a:t>
+            </a:r>
+            <a:r>
+              <a:rPr lang="en-US" sz="1600" b="1" dirty="0">
                 <a:solidFill>
                   <a:srgbClr val="FF0000"/>
                 </a:solidFill>
-              </a:rPr>
+                <a:sym typeface="Wingdings" panose="05000000000000000000" pitchFamily="2" charset="2"/>
+              </a:rPr>
+              <a:t>alId</a:t>
+            </a:r>
+          </a:p>
+          <a:p>
+            <a:r>
+              <a:rPr lang="it-IT" sz="1600" dirty="0"/>
               <a:t>nextImages</a:t>
             </a:r>
             <a:r>
+              <a:rPr lang="en-US" sz="1600" dirty="0"/>
+              <a:t> </a:t>
+            </a:r>
+            <a:r>
               <a:rPr lang="en-US" sz="1600" dirty="0">
+                <a:sym typeface="Wingdings" panose="05000000000000000000" pitchFamily="2" charset="2"/>
+              </a:rPr>
+              <a:t> </a:t>
+            </a:r>
+            <a:r>
+              <a:rPr lang="it-IT" sz="1600" b="1" dirty="0">
                 <a:solidFill>
                   <a:srgbClr val="FF0000"/>
                 </a:solidFill>
               </a:rPr>
-              <a:t> </a:t>
-            </a:r>
-            <a:r>
-              <a:rPr lang="en-US" sz="1600" dirty="0">
-                <a:solidFill>
-                  <a:srgbClr val="FF0000"/>
-                </a:solidFill>
-                <a:sym typeface="Wingdings" panose="05000000000000000000" pitchFamily="2" charset="2"/>
-              </a:rPr>
-              <a:t> </a:t>
-            </a:r>
-            <a:r>
-              <a:rPr lang="it-IT" sz="1600" dirty="0">
-                <a:solidFill>
-                  <a:srgbClr val="FF0000"/>
-                </a:solidFill>
-              </a:rPr>
               <a:t>urlNextImages</a:t>
             </a:r>
-            <a:endParaRPr lang="en-US" sz="1600" dirty="0">
+            <a:endParaRPr lang="en-US" sz="1600" b="1" dirty="0">
               <a:solidFill>
                 <a:srgbClr val="FF0000"/>
               </a:solidFill>
@@ -4111,39 +4119,28 @@
           </a:p>
           <a:p>
             <a:r>
-              <a:rPr lang="it-IT" sz="1600" dirty="0">
+              <a:rPr lang="it-IT" sz="1600" dirty="0"/>
+              <a:t>previousImages</a:t>
+            </a:r>
+            <a:r>
+              <a:rPr lang="en-US" sz="1600" dirty="0"/>
+              <a:t> </a:t>
+            </a:r>
+            <a:r>
+              <a:rPr lang="en-US" sz="1600" dirty="0">
+                <a:sym typeface="Wingdings" panose="05000000000000000000" pitchFamily="2" charset="2"/>
+              </a:rPr>
+              <a:t> </a:t>
+            </a:r>
+            <a:r>
+              <a:rPr lang="it-IT" sz="1600" b="1" dirty="0">
                 <a:solidFill>
                   <a:srgbClr val="FF0000"/>
                 </a:solidFill>
               </a:rPr>
-              <a:t>previousImages</a:t>
-            </a:r>
-            <a:r>
-              <a:rPr lang="en-US" sz="1600" dirty="0">
-                <a:solidFill>
-                  <a:srgbClr val="FF0000"/>
-                </a:solidFill>
-              </a:rPr>
-              <a:t> </a:t>
-            </a:r>
-            <a:r>
-              <a:rPr lang="en-US" sz="1600" dirty="0">
-                <a:solidFill>
-                  <a:srgbClr val="FF0000"/>
-                </a:solidFill>
-                <a:sym typeface="Wingdings" panose="05000000000000000000" pitchFamily="2" charset="2"/>
-              </a:rPr>
-              <a:t> </a:t>
-            </a:r>
-            <a:r>
-              <a:rPr lang="it-IT" sz="1600" dirty="0">
-                <a:solidFill>
-                  <a:srgbClr val="FF0000"/>
-                </a:solidFill>
-              </a:rPr>
               <a:t>urlPreviousImages</a:t>
             </a:r>
-            <a:endParaRPr lang="en-US" sz="1600" dirty="0">
+            <a:endParaRPr lang="en-US" sz="1600" b="1" dirty="0">
               <a:solidFill>
                 <a:srgbClr val="FF0000"/>
               </a:solidFill>
@@ -4196,7 +4193,7 @@
           <a:p>
             <a:pPr algn="l"/>
             <a:r>
-              <a:rPr lang="it-IT" sz="1600" dirty="0">
+              <a:rPr lang="it-IT" sz="1600" b="1" dirty="0">
                 <a:solidFill>
                   <a:srgbClr val="FF0000"/>
                 </a:solidFill>
@@ -4211,7 +4208,7 @@
           <a:p>
             <a:pPr algn="l"/>
             <a:r>
-              <a:rPr lang="it-IT" sz="1600" dirty="0">
+              <a:rPr lang="it-IT" sz="1600" b="1" dirty="0">
                 <a:solidFill>
                   <a:srgbClr val="FF0000"/>
                 </a:solidFill>
@@ -4266,31 +4263,47 @@
               <a:t>/GetImagesOfAlbum?albumId=</a:t>
             </a:r>
             <a:r>
+              <a:rPr lang="it-IT" sz="1600" b="1" dirty="0">
+                <a:solidFill>
+                  <a:srgbClr val="FF0000"/>
+                </a:solidFill>
+              </a:rPr>
+              <a:t>alId</a:t>
+            </a:r>
+            <a:r>
               <a:rPr lang="it-IT" sz="1600" dirty="0">
                 <a:solidFill>
                   <a:srgbClr val="FF0000"/>
                 </a:solidFill>
               </a:rPr>
-              <a:t>alId </a:t>
+              <a:t> </a:t>
             </a:r>
             <a:r>
               <a:rPr lang="it-IT" sz="1600" dirty="0"/>
               <a:t>&amp;nextImages= </a:t>
             </a:r>
             <a:r>
+              <a:rPr lang="it-IT" sz="1600" b="1" dirty="0">
+                <a:solidFill>
+                  <a:srgbClr val="FF0000"/>
+                </a:solidFill>
+              </a:rPr>
+              <a:t>urlNextImages</a:t>
+            </a:r>
+            <a:r>
               <a:rPr lang="it-IT" sz="1600" dirty="0">
                 <a:solidFill>
                   <a:srgbClr val="FF0000"/>
                 </a:solidFill>
               </a:rPr>
-              <a:t>urlNextImages </a:t>
+              <a:t> </a:t>
             </a:r>
             <a:r>
               <a:rPr lang="it-IT" sz="1600" dirty="0"/>
               <a:t>&amp;previousImages=</a:t>
             </a:r>
             <a:r>
-              <a:rPr lang="it-IT" sz="1600" dirty="0">
+              <a:rPr lang="it-IT" sz="1600" b="1" dirty="0">
                 <a:solidFill>
                   <a:srgbClr val="FF0000"/>
                 </a:solidFill>
@@ -4872,8 +4885,8 @@
         </p:nvSpPr>
         <p:spPr>
           <a:xfrm>
-            <a:off x="4075568" y="2793708"/>
-            <a:ext cx="2335448" cy="584775"/>
+            <a:off x="4058868" y="3363288"/>
+            <a:ext cx="4135940" cy="338554"/>
           </a:xfrm>
           <a:prstGeom prst="rect">
             <a:avLst/>
@@ -4890,113 +4903,119 @@
               <a:rPr lang="en-US" sz="1600" dirty="0"/>
               <a:t>CreateMessage</a:t>
             </a:r>
+            <a:r>
+              <a:rPr lang="en-US" sz="1600" dirty="0">
+                <a:solidFill>
+                  <a:srgbClr val="FF0000"/>
+                </a:solidFill>
+              </a:rPr>
+              <a:t>(</a:t>
+            </a:r>
+            <a:r>
+              <a:rPr lang="en-US" sz="1600" b="1" dirty="0">
+                <a:solidFill>
+                  <a:srgbClr val="FF0000"/>
+                </a:solidFill>
+                <a:sym typeface="Wingdings" panose="05000000000000000000" pitchFamily="2" charset="2"/>
+              </a:rPr>
+              <a:t>comment</a:t>
+            </a:r>
+            <a:r>
+              <a:rPr lang="en-US" sz="1600" dirty="0">
+                <a:sym typeface="Wingdings" panose="05000000000000000000" pitchFamily="2" charset="2"/>
+              </a:rPr>
+              <a:t> </a:t>
+            </a:r>
+            <a:r>
+              <a:rPr lang="en-US" sz="1600" dirty="0">
+                <a:solidFill>
+                  <a:srgbClr val="FF0000"/>
+                </a:solidFill>
+                <a:sym typeface="Wingdings" panose="05000000000000000000" pitchFamily="2" charset="2"/>
+              </a:rPr>
+              <a:t>,</a:t>
+            </a:r>
+            <a:r>
+              <a:rPr lang="en-US" sz="1600" dirty="0">
+                <a:sym typeface="Wingdings" panose="05000000000000000000" pitchFamily="2" charset="2"/>
+              </a:rPr>
+              <a:t> </a:t>
+            </a:r>
+            <a:r>
+              <a:rPr lang="en-US" sz="1600" b="1" dirty="0">
+                <a:solidFill>
+                  <a:srgbClr val="FF0000"/>
+                </a:solidFill>
+                <a:sym typeface="Wingdings" panose="05000000000000000000" pitchFamily="2" charset="2"/>
+              </a:rPr>
+              <a:t>imgId</a:t>
+            </a:r>
+            <a:r>
+              <a:rPr lang="en-US" sz="1600" dirty="0">
+                <a:solidFill>
+                  <a:srgbClr val="FF0000"/>
+                </a:solidFill>
+                <a:sym typeface="Wingdings" panose="05000000000000000000" pitchFamily="2" charset="2"/>
+              </a:rPr>
+              <a:t>,</a:t>
+            </a:r>
+            <a:r>
+              <a:rPr lang="en-US" sz="1600" dirty="0">
+                <a:sym typeface="Wingdings" panose="05000000000000000000" pitchFamily="2" charset="2"/>
+              </a:rPr>
+              <a:t> </a:t>
+            </a:r>
+            <a:r>
+              <a:rPr lang="en-US" sz="1600" b="1" dirty="0">
+                <a:solidFill>
+                  <a:srgbClr val="CC0099"/>
+                </a:solidFill>
+                <a:sym typeface="Wingdings" panose="05000000000000000000" pitchFamily="2" charset="2"/>
+              </a:rPr>
+              <a:t>user.getId()</a:t>
+            </a:r>
+            <a:r>
+              <a:rPr lang="en-US" sz="1600" dirty="0">
+                <a:solidFill>
+                  <a:srgbClr val="FF0000"/>
+                </a:solidFill>
+              </a:rPr>
+              <a:t>)</a:t>
+            </a:r>
+          </a:p>
+        </p:txBody>
+      </p:sp>
+      <p:sp>
+        <p:nvSpPr>
+          <p:cNvPr id="39" name="TextBox 38"/>
+          <p:cNvSpPr txBox="1"/>
+          <p:nvPr/>
+        </p:nvSpPr>
+        <p:spPr>
+          <a:xfrm>
+            <a:off x="4238363" y="4625184"/>
+            <a:ext cx="6691512" cy="1077218"/>
+          </a:xfrm>
+          <a:prstGeom prst="rect">
+            <a:avLst/>
+          </a:prstGeom>
+          <a:noFill/>
+        </p:spPr>
+        <p:txBody>
+          <a:bodyPr wrap="none" rtlCol="0">
+            <a:spAutoFit/>
+          </a:bodyPr>
+          <a:lstStyle/>
+          <a:p>
+            <a:pPr algn="l"/>
+            <a:r>
+              <a:rPr lang="en-US" sz="1600" dirty="0"/>
+              <a:t>Redirect</a:t>
+            </a:r>
             <a:br>
               <a:rPr lang="en-US" sz="1600" dirty="0"/>
             </a:br>
             <a:r>
-              <a:rPr lang="en-US" sz="1600" dirty="0">
-                <a:solidFill>
-                  <a:srgbClr val="FF0000"/>
-                </a:solidFill>
-              </a:rPr>
-              <a:t>(</a:t>
-            </a:r>
-            <a:r>
-              <a:rPr lang="en-US" sz="1600" dirty="0">
-                <a:solidFill>
-                  <a:srgbClr val="FF0000"/>
-                </a:solidFill>
-                <a:sym typeface="Wingdings" panose="05000000000000000000" pitchFamily="2" charset="2"/>
-              </a:rPr>
-              <a:t>comment</a:t>
-            </a:r>
-            <a:r>
-              <a:rPr lang="en-US" sz="1600" dirty="0">
-                <a:sym typeface="Wingdings" panose="05000000000000000000" pitchFamily="2" charset="2"/>
-              </a:rPr>
-              <a:t> </a:t>
-            </a:r>
-            <a:r>
-              <a:rPr lang="en-US" sz="1600" dirty="0">
-                <a:solidFill>
-                  <a:srgbClr val="FF0000"/>
-                </a:solidFill>
-                <a:sym typeface="Wingdings" panose="05000000000000000000" pitchFamily="2" charset="2"/>
-              </a:rPr>
-              <a:t>,</a:t>
-            </a:r>
-            <a:r>
-              <a:rPr lang="en-US" sz="1600" dirty="0">
-                <a:sym typeface="Wingdings" panose="05000000000000000000" pitchFamily="2" charset="2"/>
-              </a:rPr>
-              <a:t> </a:t>
-            </a:r>
-            <a:r>
-              <a:rPr lang="en-US" sz="1600" dirty="0">
-                <a:solidFill>
-                  <a:srgbClr val="FF0000"/>
-                </a:solidFill>
-                <a:sym typeface="Wingdings" panose="05000000000000000000" pitchFamily="2" charset="2"/>
-              </a:rPr>
-              <a:t>imgId,</a:t>
-            </a:r>
-            <a:r>
-              <a:rPr lang="en-US" sz="1600" dirty="0">
-                <a:sym typeface="Wingdings" panose="05000000000000000000" pitchFamily="2" charset="2"/>
-              </a:rPr>
-              <a:t> </a:t>
-            </a:r>
-            <a:r>
-              <a:rPr lang="en-US" sz="1600" dirty="0">
-                <a:solidFill>
-                  <a:srgbClr val="FF0000"/>
-                </a:solidFill>
-                <a:sym typeface="Wingdings" panose="05000000000000000000" pitchFamily="2" charset="2"/>
-              </a:rPr>
-              <a:t>userId</a:t>
-            </a:r>
-            <a:r>
-              <a:rPr lang="en-US" sz="1600" dirty="0">
-                <a:solidFill>
-                  <a:srgbClr val="FF0000"/>
-                </a:solidFill>
-              </a:rPr>
-              <a:t>)</a:t>
-            </a:r>
-          </a:p>
-        </p:txBody>
-      </p:sp>
-      <p:sp>
-        <p:nvSpPr>
-          <p:cNvPr id="39" name="TextBox 38"/>
-          <p:cNvSpPr txBox="1"/>
-          <p:nvPr/>
-        </p:nvSpPr>
-        <p:spPr>
-          <a:xfrm>
-            <a:off x="4238363" y="4625184"/>
-            <a:ext cx="6622197" cy="1077218"/>
-          </a:xfrm>
-          <a:prstGeom prst="rect">
-            <a:avLst/>
-          </a:prstGeom>
-          <a:noFill/>
-        </p:spPr>
-        <p:txBody>
-          <a:bodyPr wrap="none" rtlCol="0">
-            <a:spAutoFit/>
-          </a:bodyPr>
-          <a:lstStyle/>
-          <a:p>
-            <a:pPr algn="l"/>
-            <a:r>
-              <a:rPr lang="en-US" sz="1600" dirty="0"/>
-              <a:t>Redirect</a:t>
-            </a:r>
-            <a:br>
-              <a:rPr lang="en-US" sz="1600" dirty="0"/>
-            </a:br>
-            <a:r>
               <a:rPr lang="en-US" sz="1600" dirty="0"/>
               <a:t>/</a:t>
             </a:r>
@@ -5005,24 +5024,40 @@
               <a:t>GetImagesOfAlbum?albumId=" + </a:t>
             </a:r>
             <a:r>
+              <a:rPr lang="it-IT" sz="1600" b="1" dirty="0">
+                <a:solidFill>
+                  <a:srgbClr val="FF0000"/>
+                </a:solidFill>
+              </a:rPr>
+              <a:t>alId</a:t>
+            </a:r>
+            <a:r>
               <a:rPr lang="it-IT" sz="1600" dirty="0">
                 <a:solidFill>
                   <a:srgbClr val="FF0000"/>
                 </a:solidFill>
               </a:rPr>
-              <a:t>alId </a:t>
+              <a:t> </a:t>
             </a:r>
             <a:r>
               <a:rPr lang="it-IT" sz="1600" dirty="0"/>
               <a:t>+ "&amp;imageId=" + </a:t>
             </a:r>
             <a:r>
+              <a:rPr lang="it-IT" sz="1600" b="1" dirty="0">
+                <a:solidFill>
+                  <a:srgbClr val="FF0000"/>
+                </a:solidFill>
+              </a:rPr>
+              <a:t>imgId</a:t>
+            </a:r>
+            <a:r>
               <a:rPr lang="it-IT" sz="1600" dirty="0">
                 <a:solidFill>
                   <a:srgbClr val="FF0000"/>
                 </a:solidFill>
               </a:rPr>
-              <a:t>imgId </a:t>
+              <a:t> </a:t>
             </a:r>
             <a:r>
               <a:rPr lang="it-IT" sz="1600" dirty="0"/>
@@ -5041,14 +5076,30 @@
                   <a:srgbClr val="FF0000"/>
                 </a:solidFill>
               </a:rPr>
-              <a:t> urlNextImages </a:t>
+              <a:t> </a:t>
+            </a:r>
+            <a:r>
+              <a:rPr lang="it-IT" sz="1600" b="1" dirty="0">
+                <a:solidFill>
+                  <a:srgbClr val="FF0000"/>
+                </a:solidFill>
+              </a:rPr>
+              <a:t>urlNextImages</a:t>
+            </a:r>
+            <a:r>
+              <a:rPr lang="it-IT" sz="1600" dirty="0">
+                <a:solidFill>
+                  <a:srgbClr val="FF0000"/>
+                </a:solidFill>
+              </a:rPr>
+              <a:t> </a:t>
             </a:r>
             <a:r>
               <a:rPr lang="it-IT" sz="1600" dirty="0"/>
               <a:t>+ "&amp;previousImages=" + </a:t>
             </a:r>
             <a:r>
-              <a:rPr lang="it-IT" sz="1600" dirty="0">
+              <a:rPr lang="it-IT" sz="1600" b="1" dirty="0">
                 <a:solidFill>
                   <a:srgbClr val="FF0000"/>
                 </a:solidFill>
@@ -5086,8 +5137,8 @@
         </p:nvSpPr>
         <p:spPr>
           <a:xfrm>
-            <a:off x="106914" y="3361966"/>
-            <a:ext cx="3385197" cy="2339102"/>
+            <a:off x="86447" y="3050635"/>
+            <a:ext cx="3385197" cy="1846659"/>
           </a:xfrm>
           <a:prstGeom prst="rect">
             <a:avLst/>
@@ -5125,7 +5176,7 @@
               <a:t> </a:t>
             </a:r>
             <a:r>
-              <a:rPr lang="en-US" sz="1600" dirty="0">
+              <a:rPr lang="en-US" sz="1600" b="1" dirty="0">
                 <a:solidFill>
                   <a:srgbClr val="FF0000"/>
                 </a:solidFill>
@@ -5133,7 +5184,7 @@
               </a:rPr>
               <a:t>comment</a:t>
             </a:r>
-            <a:endParaRPr lang="en-US" sz="1600" dirty="0">
+            <a:endParaRPr lang="en-US" sz="1600" b="1" dirty="0">
               <a:solidFill>
                 <a:srgbClr val="FF0000"/>
               </a:solidFill>
@@ -5151,7 +5202,7 @@
               <a:t> </a:t>
             </a:r>
             <a:r>
-              <a:rPr lang="en-US" sz="1600" dirty="0">
+              <a:rPr lang="en-US" sz="1600" b="1" dirty="0">
                 <a:solidFill>
                   <a:srgbClr val="FF0000"/>
                 </a:solidFill>
@@ -5175,12 +5226,27 @@
             </a:r>
             <a:r>
               <a:rPr lang="en-US" sz="1600" dirty="0">
+                <a:sym typeface="Wingdings" panose="05000000000000000000" pitchFamily="2" charset="2"/>
+              </a:rPr>
+              <a:t></a:t>
+            </a:r>
+            <a:r>
+              <a:rPr lang="en-US" sz="1600" dirty="0">
                 <a:solidFill>
                   <a:srgbClr val="FF0000"/>
                 </a:solidFill>
                 <a:sym typeface="Wingdings" panose="05000000000000000000" pitchFamily="2" charset="2"/>
               </a:rPr>
-              <a:t> alId</a:t>
+              <a:t> </a:t>
+            </a:r>
+            <a:r>
+              <a:rPr lang="en-US" sz="1600" b="1" dirty="0">
+                <a:solidFill>
+                  <a:srgbClr val="FF0000"/>
+                </a:solidFill>
+                <a:sym typeface="Wingdings" panose="05000000000000000000" pitchFamily="2" charset="2"/>
+              </a:rPr>
+              <a:t>alId</a:t>
             </a:r>
           </a:p>
           <a:p>
@@ -5198,22 +5264,28 @@
             </a:r>
             <a:r>
               <a:rPr lang="en-US" sz="1600" dirty="0">
+                <a:sym typeface="Wingdings" panose="05000000000000000000" pitchFamily="2" charset="2"/>
+              </a:rPr>
+              <a:t></a:t>
+            </a:r>
+            <a:r>
+              <a:rPr lang="en-US" sz="1600" dirty="0">
                 <a:solidFill>
                   <a:srgbClr val="FF0000"/>
                 </a:solidFill>
                 <a:sym typeface="Wingdings" panose="05000000000000000000" pitchFamily="2" charset="2"/>
               </a:rPr>
-              <a:t> </a:t>
-            </a:r>
-            <a:r>
-              <a:rPr lang="it-IT" sz="1600" dirty="0">
+              <a:t> </a:t>
+            </a:r>
+            <a:r>
+              <a:rPr lang="it-IT" sz="1600" b="1" dirty="0">
                 <a:solidFill>
                   <a:srgbClr val="FF0000"/>
                 </a:solidFill>
               </a:rPr>
               <a:t>urlNextImages</a:t>
             </a:r>
-            <a:endParaRPr lang="en-US" sz="1600" dirty="0">
+            <a:endParaRPr lang="en-US" sz="1600" b="1" dirty="0">
               <a:solidFill>
                 <a:srgbClr val="FF0000"/>
               </a:solidFill>
@@ -5235,50 +5307,27 @@
             </a:r>
             <a:r>
               <a:rPr lang="en-US" sz="1600" dirty="0">
+                <a:sym typeface="Wingdings" panose="05000000000000000000" pitchFamily="2" charset="2"/>
+              </a:rPr>
+              <a:t></a:t>
+            </a:r>
+            <a:r>
+              <a:rPr lang="en-US" sz="1600" dirty="0">
                 <a:solidFill>
                   <a:srgbClr val="FF0000"/>
                 </a:solidFill>
                 <a:sym typeface="Wingdings" panose="05000000000000000000" pitchFamily="2" charset="2"/>
               </a:rPr>
-              <a:t> </a:t>
-            </a:r>
-            <a:r>
-              <a:rPr lang="it-IT" sz="1600" dirty="0">
+              <a:t> </a:t>
+            </a:r>
+            <a:r>
+              <a:rPr lang="it-IT" sz="1600" b="1" dirty="0">
                 <a:solidFill>
                   <a:srgbClr val="FF0000"/>
                 </a:solidFill>
               </a:rPr>
               <a:t>urlPreviousImages</a:t>
             </a:r>
-          </a:p>
-          <a:p>
-            <a:r>
-              <a:rPr lang="en-US" sz="1600" dirty="0"/>
-              <a:t>UserId </a:t>
-            </a:r>
-            <a:r>
-              <a:rPr lang="en-US" sz="1600" dirty="0">
-                <a:sym typeface="Wingdings" panose="05000000000000000000" pitchFamily="2" charset="2"/>
-              </a:rPr>
-              <a:t> </a:t>
-            </a:r>
-            <a:r>
-              <a:rPr lang="en-US" sz="1600" dirty="0">
-                <a:solidFill>
-                  <a:srgbClr val="FF0000"/>
-                </a:solidFill>
-                <a:sym typeface="Wingdings" panose="05000000000000000000" pitchFamily="2" charset="2"/>
-              </a:rPr>
-              <a:t>userId</a:t>
-            </a:r>
-          </a:p>
-          <a:p>
-            <a:endParaRPr lang="en-US" sz="1600" dirty="0">
-              <a:solidFill>
-                <a:srgbClr val="FF0000"/>
-              </a:solidFill>
-              <a:sym typeface="Wingdings" panose="05000000000000000000" pitchFamily="2" charset="2"/>
-            </a:endParaRPr>
           </a:p>
         </p:txBody>
       </p:sp>
@@ -5299,7 +5348,7 @@
         </p:nvCxnSpPr>
         <p:spPr>
           <a:xfrm>
-            <a:off x="9231213" y="1927255"/>
+            <a:off x="10676555" y="1930570"/>
             <a:ext cx="0" cy="4802187"/>
           </a:xfrm>
           <a:prstGeom prst="straightConnector1">
@@ -5338,7 +5387,7 @@
         </p:nvSpPr>
         <p:spPr>
           <a:xfrm>
-            <a:off x="9066113" y="3605460"/>
+            <a:off x="10511455" y="3608775"/>
             <a:ext cx="330200" cy="1152256"/>
           </a:xfrm>
           <a:prstGeom prst="rect">
@@ -5390,7 +5439,7 @@
         </p:nvSpPr>
         <p:spPr>
           <a:xfrm>
-            <a:off x="8248398" y="1425545"/>
+            <a:off x="9693740" y="1428860"/>
             <a:ext cx="1965630" cy="501710"/>
           </a:xfrm>
           <a:prstGeom prst="rect">
@@ -5457,7 +5506,7 @@
         </p:nvCxnSpPr>
         <p:spPr>
           <a:xfrm>
-            <a:off x="6774176" y="1927255"/>
+            <a:off x="8219518" y="1930570"/>
             <a:ext cx="0" cy="4802187"/>
           </a:xfrm>
           <a:prstGeom prst="straightConnector1">
@@ -5496,7 +5545,7 @@
         </p:nvSpPr>
         <p:spPr>
           <a:xfrm>
-            <a:off x="6614385" y="2818394"/>
+            <a:off x="8059727" y="2821709"/>
             <a:ext cx="330200" cy="1152256"/>
           </a:xfrm>
           <a:prstGeom prst="rect">
@@ -5548,7 +5597,7 @@
         </p:nvSpPr>
         <p:spPr>
           <a:xfrm>
-            <a:off x="5791361" y="1425545"/>
+            <a:off x="7236703" y="1428860"/>
             <a:ext cx="1965630" cy="501710"/>
           </a:xfrm>
           <a:prstGeom prst="rect">
@@ -5811,8 +5860,8 @@
         </p:nvCxnSpPr>
         <p:spPr>
           <a:xfrm>
-            <a:off x="4041985" y="4535549"/>
-            <a:ext cx="5024128" cy="0"/>
+            <a:off x="4038207" y="4625184"/>
+            <a:ext cx="6473248" cy="0"/>
           </a:xfrm>
           <a:prstGeom prst="straightConnector1">
             <a:avLst/>
@@ -5847,14 +5896,14 @@
           </p:cNvPr>
           <p:cNvCxnSpPr>
             <a:cxnSpLocks/>
-            <a:endCxn id="27" idx="1"/>
+            <a:stCxn id="30" idx="3"/>
           </p:cNvCxnSpPr>
           <p:nvPr/>
         </p:nvCxnSpPr>
         <p:spPr>
           <a:xfrm flipV="1">
-            <a:off x="4092782" y="3394522"/>
-            <a:ext cx="2521603" cy="8909"/>
+            <a:off x="4041985" y="3679969"/>
+            <a:ext cx="4017742" cy="1"/>
           </a:xfrm>
           <a:prstGeom prst="straightConnector1">
             <a:avLst/>
@@ -5878,12 +5927,212 @@
           </a:effectLst>
         </p:spPr>
       </p:cxnSp>
-      <p:sp>
-        <p:nvSpPr>
-          <p:cNvPr id="40" name="CasellaDiTesto 39">
-            <a:extLst>
-              <a:ext uri="{FF2B5EF4-FFF2-40B4-BE49-F238E27FC236}">
-                <a16:creationId xmlns:a16="http://schemas.microsoft.com/office/drawing/2014/main" id="{09B7EF99-13B3-4C02-B026-5C10DEC98FD6}"/>
+      <p:cxnSp>
+        <p:nvCxnSpPr>
+          <p:cNvPr id="37" name="Google Shape;295;p37">
+            <a:extLst>
+              <a:ext uri="{FF2B5EF4-FFF2-40B4-BE49-F238E27FC236}">
+                <a16:creationId xmlns:a16="http://schemas.microsoft.com/office/drawing/2014/main" id="{CB9BB18C-9DA4-437D-B378-FA46A6D3ACC9}"/>
+              </a:ext>
+            </a:extLst>
+          </p:cNvPr>
+          <p:cNvCxnSpPr>
+            <a:cxnSpLocks/>
+            <a:stCxn id="41" idx="2"/>
+          </p:cNvCxnSpPr>
+          <p:nvPr/>
+        </p:nvCxnSpPr>
+        <p:spPr>
+          <a:xfrm>
+            <a:off x="6056923" y="1930570"/>
+            <a:ext cx="0" cy="4802187"/>
+          </a:xfrm>
+          <a:prstGeom prst="straightConnector1">
+            <a:avLst/>
+          </a:prstGeom>
+          <a:noFill/>
+          <a:ln w="38100" cap="flat" cmpd="sng">
+            <a:solidFill>
+              <a:schemeClr val="accent1"/>
+            </a:solidFill>
+            <a:prstDash val="dot"/>
+            <a:round/>
+            <a:headEnd type="none" w="sm" len="sm"/>
+            <a:tailEnd type="none" w="sm" len="sm"/>
+          </a:ln>
+          <a:effectLst>
+            <a:outerShdw blurRad="40000" dist="23000" dir="5400000" rotWithShape="0">
+              <a:srgbClr val="000000">
+                <a:alpha val="34901"/>
+              </a:srgbClr>
+            </a:outerShdw>
+          </a:effectLst>
+        </p:spPr>
+      </p:cxnSp>
+      <p:sp>
+        <p:nvSpPr>
+          <p:cNvPr id="38" name="Google Shape;296;p37">
+            <a:extLst>
+              <a:ext uri="{FF2B5EF4-FFF2-40B4-BE49-F238E27FC236}">
+                <a16:creationId xmlns:a16="http://schemas.microsoft.com/office/drawing/2014/main" id="{AAD38B1D-09DE-4E2B-906B-DA279F634170}"/>
+              </a:ext>
+            </a:extLst>
+          </p:cNvPr>
+          <p:cNvSpPr/>
+          <p:nvPr/>
+        </p:nvSpPr>
+        <p:spPr>
+          <a:xfrm>
+            <a:off x="5889176" y="2432279"/>
+            <a:ext cx="330200" cy="985209"/>
+          </a:xfrm>
+          <a:prstGeom prst="rect">
+            <a:avLst/>
+          </a:prstGeom>
+          <a:solidFill>
+            <a:schemeClr val="lt1"/>
+          </a:solidFill>
+          <a:ln w="25400" cap="flat" cmpd="sng">
+            <a:solidFill>
+              <a:schemeClr val="accent1"/>
+            </a:solidFill>
+            <a:prstDash val="solid"/>
+            <a:round/>
+            <a:headEnd type="none" w="sm" len="sm"/>
+            <a:tailEnd type="none" w="sm" len="sm"/>
+          </a:ln>
+        </p:spPr>
+        <p:txBody>
+          <a:bodyPr spcFirstLastPara="1" wrap="square" lIns="107269" tIns="53620" rIns="107269" bIns="53620" anchor="ctr" anchorCtr="0">
+            <a:noAutofit/>
+          </a:bodyPr>
+          <a:lstStyle/>
+          <a:p>
+            <a:pPr algn="ctr"/>
+            <a:endParaRPr sz="1400">
+              <a:solidFill>
+                <a:schemeClr val="dk1"/>
+              </a:solidFill>
+              <a:latin typeface="Calibri"/>
+              <a:ea typeface="Calibri"/>
+              <a:cs typeface="Calibri"/>
+              <a:sym typeface="Calibri"/>
+            </a:endParaRPr>
+          </a:p>
+        </p:txBody>
+      </p:sp>
+      <p:sp>
+        <p:nvSpPr>
+          <p:cNvPr id="41" name="Google Shape;302;p37">
+            <a:extLst>
+              <a:ext uri="{FF2B5EF4-FFF2-40B4-BE49-F238E27FC236}">
+                <a16:creationId xmlns:a16="http://schemas.microsoft.com/office/drawing/2014/main" id="{488C495C-1301-487C-8956-1259CB400305}"/>
+              </a:ext>
+            </a:extLst>
+          </p:cNvPr>
+          <p:cNvSpPr/>
+          <p:nvPr/>
+        </p:nvSpPr>
+        <p:spPr>
+          <a:xfrm>
+            <a:off x="5074108" y="1428860"/>
+            <a:ext cx="1965630" cy="501710"/>
+          </a:xfrm>
+          <a:prstGeom prst="rect">
+            <a:avLst/>
+          </a:prstGeom>
+          <a:solidFill>
+            <a:schemeClr val="lt1"/>
+          </a:solidFill>
+          <a:ln w="25400" cap="flat" cmpd="sng">
+            <a:solidFill>
+              <a:schemeClr val="accent1"/>
+            </a:solidFill>
+            <a:prstDash val="solid"/>
+            <a:round/>
+            <a:headEnd type="none" w="sm" len="sm"/>
+            <a:tailEnd type="none" w="sm" len="sm"/>
+          </a:ln>
+        </p:spPr>
+        <p:txBody>
+          <a:bodyPr spcFirstLastPara="1" wrap="square" lIns="107269" tIns="53620" rIns="107269" bIns="53620" anchor="ctr" anchorCtr="0">
+            <a:noAutofit/>
+          </a:bodyPr>
+          <a:lstStyle/>
+          <a:p>
+            <a:pPr algn="ctr"/>
+            <a:r>
+              <a:rPr lang="es-419" sz="1600" b="1" dirty="0">
+                <a:solidFill>
+                  <a:schemeClr val="dk1"/>
+                </a:solidFill>
+                <a:latin typeface="Calibri"/>
+                <a:ea typeface="Calibri"/>
+                <a:cs typeface="Calibri"/>
+                <a:sym typeface="Calibri"/>
+              </a:rPr>
+              <a:t>Session</a:t>
+            </a:r>
+            <a:endParaRPr sz="1600" b="1" dirty="0">
+              <a:solidFill>
+                <a:schemeClr val="dk1"/>
+              </a:solidFill>
+              <a:latin typeface="Calibri"/>
+              <a:ea typeface="Calibri"/>
+              <a:cs typeface="Calibri"/>
+              <a:sym typeface="Calibri"/>
+            </a:endParaRPr>
+          </a:p>
+        </p:txBody>
+      </p:sp>
+      <p:cxnSp>
+        <p:nvCxnSpPr>
+          <p:cNvPr id="43" name="Google Shape;275;p37">
+            <a:extLst>
+              <a:ext uri="{FF2B5EF4-FFF2-40B4-BE49-F238E27FC236}">
+                <a16:creationId xmlns:a16="http://schemas.microsoft.com/office/drawing/2014/main" id="{20F71749-4EB9-483D-B4A6-47DD6B282547}"/>
+              </a:ext>
+            </a:extLst>
+          </p:cNvPr>
+          <p:cNvCxnSpPr>
+            <a:cxnSpLocks/>
+            <a:endCxn id="38" idx="1"/>
+          </p:cNvCxnSpPr>
+          <p:nvPr/>
+        </p:nvCxnSpPr>
+        <p:spPr>
+          <a:xfrm>
+            <a:off x="4038207" y="2924884"/>
+            <a:ext cx="1850969" cy="0"/>
+          </a:xfrm>
+          <a:prstGeom prst="straightConnector1">
+            <a:avLst/>
+          </a:prstGeom>
+          <a:noFill/>
+          <a:ln w="25400" cap="flat" cmpd="sng">
+            <a:solidFill>
+              <a:schemeClr val="accent1"/>
+            </a:solidFill>
+            <a:prstDash val="solid"/>
+            <a:round/>
+            <a:headEnd type="none" w="sm" len="sm"/>
+            <a:tailEnd type="stealth" w="med" len="med"/>
+          </a:ln>
+          <a:effectLst>
+            <a:outerShdw blurRad="40000" dist="20000" dir="5400000" rotWithShape="0">
+              <a:srgbClr val="000000">
+                <a:alpha val="37647"/>
+              </a:srgbClr>
+            </a:outerShdw>
+          </a:effectLst>
+        </p:spPr>
+      </p:cxnSp>
+      <p:sp>
+        <p:nvSpPr>
+          <p:cNvPr id="44" name="CasellaDiTesto 43">
+            <a:extLst>
+              <a:ext uri="{FF2B5EF4-FFF2-40B4-BE49-F238E27FC236}">
+                <a16:creationId xmlns:a16="http://schemas.microsoft.com/office/drawing/2014/main" id="{FECC38B5-A7B8-4FAC-9B28-69D5C2666B50}"/>
               </a:ext>
             </a:extLst>
           </p:cNvPr>
@@ -5892,8 +6141,8 @@
         </p:nvSpPr>
         <p:spPr>
           <a:xfrm>
-            <a:off x="0" y="462775"/>
-            <a:ext cx="12044516" cy="646331"/>
+            <a:off x="4058868" y="2579165"/>
+            <a:ext cx="1939544" cy="338554"/>
           </a:xfrm>
           <a:prstGeom prst="rect">
             <a:avLst/>
@@ -5906,77 +6155,117 @@
           </a:bodyPr>
           <a:lstStyle/>
           <a:p>
-            <a:endParaRPr lang="en-US" sz="1800" dirty="0">
+            <a:r>
+              <a:rPr lang="it-IT" sz="1600" dirty="0">
+                <a:solidFill>
+                  <a:srgbClr val="000000"/>
+                </a:solidFill>
+              </a:rPr>
+              <a:t>getAttribute(</a:t>
+            </a:r>
+            <a:r>
+              <a:rPr lang="it-IT" sz="1600" dirty="0">
+                <a:solidFill>
+                  <a:srgbClr val="2A00FF"/>
+                </a:solidFill>
+              </a:rPr>
+              <a:t>"user"</a:t>
+            </a:r>
+            <a:r>
+              <a:rPr lang="it-IT" sz="1600" dirty="0">
+                <a:solidFill>
+                  <a:srgbClr val="000000"/>
+                </a:solidFill>
+              </a:rPr>
+              <a:t>);</a:t>
+            </a:r>
+            <a:endParaRPr lang="it-IT" sz="1600" dirty="0"/>
+          </a:p>
+        </p:txBody>
+      </p:sp>
+      <p:cxnSp>
+        <p:nvCxnSpPr>
+          <p:cNvPr id="45" name="Google Shape;317;p38">
+            <a:extLst>
+              <a:ext uri="{FF2B5EF4-FFF2-40B4-BE49-F238E27FC236}">
+                <a16:creationId xmlns:a16="http://schemas.microsoft.com/office/drawing/2014/main" id="{E6EF4CCA-8FFD-418E-BDEF-89EB701368B4}"/>
+              </a:ext>
+            </a:extLst>
+          </p:cNvPr>
+          <p:cNvCxnSpPr>
+            <a:cxnSpLocks/>
+          </p:cNvCxnSpPr>
+          <p:nvPr/>
+        </p:nvCxnSpPr>
+        <p:spPr>
+          <a:xfrm flipH="1">
+            <a:off x="4053778" y="3224981"/>
+            <a:ext cx="1776752" cy="9419"/>
+          </a:xfrm>
+          <a:prstGeom prst="straightConnector1">
+            <a:avLst/>
+          </a:prstGeom>
+          <a:noFill/>
+          <a:ln w="25400" cap="flat" cmpd="sng">
+            <a:solidFill>
+              <a:schemeClr val="accent1"/>
+            </a:solidFill>
+            <a:prstDash val="sysDash"/>
+            <a:round/>
+            <a:headEnd type="none" w="sm" len="sm"/>
+            <a:tailEnd type="stealth" w="med" len="med"/>
+          </a:ln>
+          <a:effectLst>
+            <a:outerShdw blurRad="40000" dist="20000" dir="5400000" rotWithShape="0">
+              <a:srgbClr val="000000">
+                <a:alpha val="37650"/>
+              </a:srgbClr>
+            </a:outerShdw>
+          </a:effectLst>
+        </p:spPr>
+      </p:cxnSp>
+      <p:sp>
+        <p:nvSpPr>
+          <p:cNvPr id="46" name="CasellaDiTesto 45">
+            <a:extLst>
+              <a:ext uri="{FF2B5EF4-FFF2-40B4-BE49-F238E27FC236}">
+                <a16:creationId xmlns:a16="http://schemas.microsoft.com/office/drawing/2014/main" id="{F6CD9AF4-FCE5-4191-9770-5C78D94995FB}"/>
+              </a:ext>
+            </a:extLst>
+          </p:cNvPr>
+          <p:cNvSpPr txBox="1"/>
+          <p:nvPr/>
+        </p:nvSpPr>
+        <p:spPr>
+          <a:xfrm>
+            <a:off x="4258071" y="2921900"/>
+            <a:ext cx="844678" cy="338554"/>
+          </a:xfrm>
+          <a:prstGeom prst="rect">
+            <a:avLst/>
+          </a:prstGeom>
+          <a:noFill/>
+        </p:spPr>
+        <p:txBody>
+          <a:bodyPr wrap="square">
+            <a:spAutoFit/>
+          </a:bodyPr>
+          <a:lstStyle/>
+          <a:p>
+            <a:r>
+              <a:rPr lang="en-US" sz="1600" b="1" dirty="0">
+                <a:solidFill>
+                  <a:srgbClr val="CC0099"/>
+                </a:solidFill>
+                <a:sym typeface="Wingdings" panose="05000000000000000000" pitchFamily="2" charset="2"/>
+              </a:rPr>
+              <a:t>user</a:t>
+            </a:r>
+            <a:endParaRPr lang="it-IT" sz="1600" b="1" dirty="0">
               <a:solidFill>
-                <a:srgbClr val="FF0000"/>
+                <a:srgbClr val="CC0099"/>
               </a:solidFill>
             </a:endParaRPr>
-          </a:p>
-          <a:p>
-            <a:r>
-              <a:rPr lang="en-US" sz="1800" b="1" dirty="0"/>
-              <a:t>From: </a:t>
-            </a:r>
-            <a:r>
-              <a:rPr lang="en-US" sz="1800" dirty="0"/>
-              <a:t>/GetImagesOfAlbum?albumId=</a:t>
-            </a:r>
-            <a:r>
-              <a:rPr lang="en-US" sz="1800" dirty="0">
-                <a:solidFill>
-                  <a:srgbClr val="FF0000"/>
-                </a:solidFill>
-                <a:sym typeface="Wingdings" panose="05000000000000000000" pitchFamily="2" charset="2"/>
-              </a:rPr>
-              <a:t> alId</a:t>
-            </a:r>
-            <a:r>
-              <a:rPr lang="en-US" sz="1800" dirty="0"/>
-              <a:t>&amp;imageId=</a:t>
-            </a:r>
-            <a:r>
-              <a:rPr lang="en-US" sz="1800" dirty="0">
-                <a:solidFill>
-                  <a:srgbClr val="FF0000"/>
-                </a:solidFill>
-                <a:sym typeface="Wingdings" panose="05000000000000000000" pitchFamily="2" charset="2"/>
-              </a:rPr>
-              <a:t>imgId </a:t>
-            </a:r>
-            <a:r>
-              <a:rPr lang="en-US" sz="1800" dirty="0"/>
-              <a:t>&amp;nextImages=</a:t>
-            </a:r>
-            <a:r>
-              <a:rPr lang="it-IT" sz="1800" dirty="0">
-                <a:solidFill>
-                  <a:srgbClr val="FF0000"/>
-                </a:solidFill>
-              </a:rPr>
-              <a:t>urlNextImages</a:t>
-            </a:r>
-            <a:r>
-              <a:rPr lang="en-US" dirty="0">
-                <a:solidFill>
-                  <a:srgbClr val="FF0000"/>
-                </a:solidFill>
-                <a:sym typeface="Wingdings" panose="05000000000000000000" pitchFamily="2" charset="2"/>
-              </a:rPr>
-              <a:t> </a:t>
-            </a:r>
-            <a:r>
-              <a:rPr lang="en-US" sz="1800" dirty="0"/>
-              <a:t>&amp;previousImages=</a:t>
-            </a:r>
-            <a:r>
-              <a:rPr lang="it-IT" sz="1800" dirty="0">
-                <a:solidFill>
-                  <a:srgbClr val="FF0000"/>
-                </a:solidFill>
-              </a:rPr>
-              <a:t>urlPreviousImages</a:t>
-            </a:r>
-            <a:endParaRPr lang="en-US" sz="1800" dirty="0"/>
           </a:p>
         </p:txBody>
       </p:sp>
@@ -9781,7 +10070,7 @@
         </p:nvSpPr>
         <p:spPr>
           <a:xfrm>
-            <a:off x="2278701" y="2184247"/>
+            <a:off x="2278701" y="2163951"/>
             <a:ext cx="9548992" cy="4529030"/>
           </a:xfrm>
           <a:prstGeom prst="rect">
@@ -11362,7 +11651,7 @@
         </p:nvSpPr>
         <p:spPr>
           <a:xfrm>
-            <a:off x="2321439" y="4245289"/>
+            <a:off x="2362723" y="4195538"/>
             <a:ext cx="784960" cy="369332"/>
           </a:xfrm>
           <a:prstGeom prst="rect">
@@ -18317,7 +18606,7 @@
         </p:nvSpPr>
         <p:spPr>
           <a:xfrm>
-            <a:off x="3502255" y="5149554"/>
+            <a:off x="3463964" y="5484405"/>
             <a:ext cx="6094070" cy="584775"/>
           </a:xfrm>
           <a:prstGeom prst="rect">
@@ -18558,7 +18847,7 @@
         </p:nvSpPr>
         <p:spPr>
           <a:xfrm>
-            <a:off x="3509170" y="3603698"/>
+            <a:off x="3497220" y="3554443"/>
             <a:ext cx="3590870" cy="338554"/>
           </a:xfrm>
           <a:prstGeom prst="rect">
@@ -18607,7 +18896,7 @@
         </p:nvSpPr>
         <p:spPr>
           <a:xfrm>
-            <a:off x="3645476" y="3974128"/>
+            <a:off x="3506540" y="3805762"/>
             <a:ext cx="1077796" cy="338554"/>
           </a:xfrm>
           <a:prstGeom prst="rect">
@@ -18647,7 +18936,7 @@
         </p:nvSpPr>
         <p:spPr>
           <a:xfrm>
-            <a:off x="-38116" y="4484237"/>
+            <a:off x="-38116" y="4867690"/>
             <a:ext cx="3198115" cy="584775"/>
           </a:xfrm>
           <a:prstGeom prst="rect">
@@ -18752,7 +19041,7 @@
         </p:nvSpPr>
         <p:spPr>
           <a:xfrm>
-            <a:off x="3524773" y="5810417"/>
+            <a:off x="3495811" y="6085184"/>
             <a:ext cx="6136848" cy="369332"/>
           </a:xfrm>
           <a:prstGeom prst="rect">
@@ -19016,8 +19305,8 @@
         </p:nvSpPr>
         <p:spPr>
           <a:xfrm>
-            <a:off x="9492771" y="4789749"/>
-            <a:ext cx="330200" cy="1152256"/>
+            <a:off x="9492771" y="4789748"/>
+            <a:ext cx="330200" cy="1355763"/>
           </a:xfrm>
           <a:prstGeom prst="rect">
             <a:avLst/>
@@ -19174,8 +19463,8 @@
         </p:nvSpPr>
         <p:spPr>
           <a:xfrm>
-            <a:off x="7971318" y="3446477"/>
-            <a:ext cx="330200" cy="1152256"/>
+            <a:off x="7971318" y="3446476"/>
+            <a:ext cx="330200" cy="1611003"/>
           </a:xfrm>
           <a:prstGeom prst="rect">
             <a:avLst/>
@@ -19491,7 +19780,7 @@
         <p:spPr>
           <a:xfrm>
             <a:off x="3187117" y="1654772"/>
-            <a:ext cx="330200" cy="4735665"/>
+            <a:ext cx="330200" cy="4897527"/>
           </a:xfrm>
           <a:prstGeom prst="rect">
             <a:avLst/>
@@ -19688,7 +19977,7 @@
         </p:nvCxnSpPr>
         <p:spPr>
           <a:xfrm>
-            <a:off x="3524773" y="3911349"/>
+            <a:off x="3534925" y="3832114"/>
             <a:ext cx="4446545" cy="0"/>
           </a:xfrm>
           <a:prstGeom prst="straightConnector1">
@@ -19729,7 +20018,7 @@
         </p:nvCxnSpPr>
         <p:spPr>
           <a:xfrm flipV="1">
-            <a:off x="3514963" y="5731512"/>
+            <a:off x="3516670" y="5998818"/>
             <a:ext cx="5967998" cy="15943"/>
           </a:xfrm>
           <a:prstGeom prst="straightConnector1">
@@ -19770,7 +20059,7 @@
         </p:nvCxnSpPr>
         <p:spPr>
           <a:xfrm>
-            <a:off x="3534925" y="6170268"/>
+            <a:off x="3533081" y="6425943"/>
             <a:ext cx="7654457" cy="9481"/>
           </a:xfrm>
           <a:prstGeom prst="straightConnector1">
@@ -19811,7 +20100,7 @@
         </p:nvCxnSpPr>
         <p:spPr>
           <a:xfrm flipH="1" flipV="1">
-            <a:off x="3513572" y="4261883"/>
+            <a:off x="3533081" y="4127381"/>
             <a:ext cx="4436391" cy="5961"/>
           </a:xfrm>
           <a:prstGeom prst="straightConnector1">
@@ -20181,7 +20470,7 @@
         </p:nvGrpSpPr>
         <p:grpSpPr>
           <a:xfrm>
-            <a:off x="2690571" y="4658268"/>
+            <a:off x="2690571" y="5041721"/>
             <a:ext cx="484693" cy="272090"/>
             <a:chOff x="614149" y="4401223"/>
             <a:chExt cx="484693" cy="507248"/>
@@ -20326,7 +20615,7 @@
         </p:nvSpPr>
         <p:spPr>
           <a:xfrm>
-            <a:off x="-32351" y="3892085"/>
+            <a:off x="-32351" y="4275538"/>
             <a:ext cx="2596019" cy="584775"/>
           </a:xfrm>
           <a:prstGeom prst="rect">
@@ -20393,7 +20682,7 @@
         </p:nvGrpSpPr>
         <p:grpSpPr>
           <a:xfrm>
-            <a:off x="2686022" y="4163437"/>
+            <a:off x="2686022" y="4546890"/>
             <a:ext cx="484693" cy="272090"/>
             <a:chOff x="614149" y="4401223"/>
             <a:chExt cx="484693" cy="507248"/>
@@ -20538,7 +20827,7 @@
         </p:nvSpPr>
         <p:spPr>
           <a:xfrm>
-            <a:off x="-28918" y="5008271"/>
+            <a:off x="-28918" y="5391724"/>
             <a:ext cx="2674233" cy="584775"/>
           </a:xfrm>
           <a:prstGeom prst="rect">
@@ -20614,7 +20903,7 @@
         </p:nvGrpSpPr>
         <p:grpSpPr>
           <a:xfrm>
-            <a:off x="2690571" y="5165036"/>
+            <a:off x="2690571" y="5548489"/>
             <a:ext cx="484693" cy="272090"/>
             <a:chOff x="614149" y="4401223"/>
             <a:chExt cx="484693" cy="507248"/>
@@ -20745,6 +21034,287 @@
           </p:style>
         </p:cxnSp>
       </p:grpSp>
+      <p:cxnSp>
+        <p:nvCxnSpPr>
+          <p:cNvPr id="63" name="Google Shape;299;p37">
+            <a:extLst>
+              <a:ext uri="{FF2B5EF4-FFF2-40B4-BE49-F238E27FC236}">
+                <a16:creationId xmlns:a16="http://schemas.microsoft.com/office/drawing/2014/main" id="{0E4DFC54-D29A-480A-AE1E-90483DC7A5D9}"/>
+              </a:ext>
+            </a:extLst>
+          </p:cNvPr>
+          <p:cNvCxnSpPr>
+            <a:cxnSpLocks/>
+          </p:cNvCxnSpPr>
+          <p:nvPr/>
+        </p:nvCxnSpPr>
+        <p:spPr>
+          <a:xfrm>
+            <a:off x="3522927" y="4431152"/>
+            <a:ext cx="4446545" cy="0"/>
+          </a:xfrm>
+          <a:prstGeom prst="straightConnector1">
+            <a:avLst/>
+          </a:prstGeom>
+          <a:noFill/>
+          <a:ln w="25400" cap="flat" cmpd="sng">
+            <a:solidFill>
+              <a:schemeClr val="accent1"/>
+            </a:solidFill>
+            <a:prstDash val="solid"/>
+            <a:round/>
+            <a:headEnd type="none" w="sm" len="sm"/>
+            <a:tailEnd type="stealth" w="med" len="med"/>
+          </a:ln>
+          <a:effectLst>
+            <a:outerShdw blurRad="40000" dist="20000" dir="5400000" rotWithShape="0">
+              <a:srgbClr val="000000">
+                <a:alpha val="37647"/>
+              </a:srgbClr>
+            </a:outerShdw>
+          </a:effectLst>
+        </p:spPr>
+      </p:cxnSp>
+      <p:sp>
+        <p:nvSpPr>
+          <p:cNvPr id="97" name="CasellaDiTesto 96">
+            <a:extLst>
+              <a:ext uri="{FF2B5EF4-FFF2-40B4-BE49-F238E27FC236}">
+                <a16:creationId xmlns:a16="http://schemas.microsoft.com/office/drawing/2014/main" id="{8AADB68C-A405-43FF-8C8B-46234A38F273}"/>
+              </a:ext>
+            </a:extLst>
+          </p:cNvPr>
+          <p:cNvSpPr txBox="1"/>
+          <p:nvPr/>
+        </p:nvSpPr>
+        <p:spPr>
+          <a:xfrm>
+            <a:off x="3466420" y="4140682"/>
+            <a:ext cx="3206921" cy="307777"/>
+          </a:xfrm>
+          <a:prstGeom prst="rect">
+            <a:avLst/>
+          </a:prstGeom>
+          <a:noFill/>
+        </p:spPr>
+        <p:txBody>
+          <a:bodyPr wrap="square">
+            <a:spAutoFit/>
+          </a:bodyPr>
+          <a:lstStyle/>
+          <a:p>
+            <a:r>
+              <a:rPr lang="en-US" sz="1400" dirty="0"/>
+              <a:t>findUsernameOfComments(</a:t>
+            </a:r>
+            <a:r>
+              <a:rPr lang="en-US" sz="1400" b="1" dirty="0">
+                <a:solidFill>
+                  <a:srgbClr val="0070C0"/>
+                </a:solidFill>
+              </a:rPr>
+              <a:t>comments</a:t>
+            </a:r>
+            <a:r>
+              <a:rPr lang="en-US" sz="1400" dirty="0"/>
+              <a:t>)</a:t>
+            </a:r>
+          </a:p>
+        </p:txBody>
+      </p:sp>
+      <p:grpSp>
+        <p:nvGrpSpPr>
+          <p:cNvPr id="98" name="Group 61">
+            <a:extLst>
+              <a:ext uri="{FF2B5EF4-FFF2-40B4-BE49-F238E27FC236}">
+                <a16:creationId xmlns:a16="http://schemas.microsoft.com/office/drawing/2014/main" id="{B7A7CD34-E127-4344-817A-DBE6F3DEA54F}"/>
+              </a:ext>
+            </a:extLst>
+          </p:cNvPr>
+          <p:cNvGrpSpPr/>
+          <p:nvPr/>
+        </p:nvGrpSpPr>
+        <p:grpSpPr>
+          <a:xfrm>
+            <a:off x="7479126" y="4595600"/>
+            <a:ext cx="484693" cy="272090"/>
+            <a:chOff x="614149" y="4401223"/>
+            <a:chExt cx="484693" cy="507248"/>
+          </a:xfrm>
+        </p:grpSpPr>
+        <p:cxnSp>
+          <p:nvCxnSpPr>
+            <p:cNvPr id="99" name="Straight Connector 51">
+              <a:extLst>
+                <a:ext uri="{FF2B5EF4-FFF2-40B4-BE49-F238E27FC236}">
+                  <a16:creationId xmlns:a16="http://schemas.microsoft.com/office/drawing/2014/main" id="{A2BDCF00-CE62-4BF9-B017-522718DEA162}"/>
+                </a:ext>
+              </a:extLst>
+            </p:cNvPr>
+            <p:cNvCxnSpPr/>
+            <p:nvPr/>
+          </p:nvCxnSpPr>
+          <p:spPr>
+            <a:xfrm flipH="1">
+              <a:off x="614149" y="4401223"/>
+              <a:ext cx="484693" cy="0"/>
+            </a:xfrm>
+            <a:prstGeom prst="line">
+              <a:avLst/>
+            </a:prstGeom>
+            <a:ln w="28575">
+              <a:solidFill>
+                <a:srgbClr val="0070C0"/>
+              </a:solidFill>
+            </a:ln>
+          </p:spPr>
+          <p:style>
+            <a:lnRef idx="1">
+              <a:schemeClr val="accent1"/>
+            </a:lnRef>
+            <a:fillRef idx="0">
+              <a:schemeClr val="accent1"/>
+            </a:fillRef>
+            <a:effectRef idx="0">
+              <a:schemeClr val="accent1"/>
+            </a:effectRef>
+            <a:fontRef idx="minor">
+              <a:schemeClr val="tx1"/>
+            </a:fontRef>
+          </p:style>
+        </p:cxnSp>
+        <p:cxnSp>
+          <p:nvCxnSpPr>
+            <p:cNvPr id="100" name="Straight Connector 56">
+              <a:extLst>
+                <a:ext uri="{FF2B5EF4-FFF2-40B4-BE49-F238E27FC236}">
+                  <a16:creationId xmlns:a16="http://schemas.microsoft.com/office/drawing/2014/main" id="{C1C30146-36BD-476A-8286-142AFA52E49E}"/>
+                </a:ext>
+              </a:extLst>
+            </p:cNvPr>
+            <p:cNvCxnSpPr/>
+            <p:nvPr/>
+          </p:nvCxnSpPr>
+          <p:spPr>
+            <a:xfrm>
+              <a:off x="614149" y="4401223"/>
+              <a:ext cx="0" cy="505677"/>
+            </a:xfrm>
+            <a:prstGeom prst="line">
+              <a:avLst/>
+            </a:prstGeom>
+            <a:ln w="28575">
+              <a:solidFill>
+                <a:srgbClr val="0070C0"/>
+              </a:solidFill>
+            </a:ln>
+          </p:spPr>
+          <p:style>
+            <a:lnRef idx="1">
+              <a:schemeClr val="accent1"/>
+            </a:lnRef>
+            <a:fillRef idx="0">
+              <a:schemeClr val="accent1"/>
+            </a:fillRef>
+            <a:effectRef idx="0">
+              <a:schemeClr val="accent1"/>
+            </a:effectRef>
+            <a:fontRef idx="minor">
+              <a:schemeClr val="tx1"/>
+            </a:fontRef>
+          </p:style>
+        </p:cxnSp>
+        <p:cxnSp>
+          <p:nvCxnSpPr>
+            <p:cNvPr id="101" name="Straight Arrow Connector 60">
+              <a:extLst>
+                <a:ext uri="{FF2B5EF4-FFF2-40B4-BE49-F238E27FC236}">
+                  <a16:creationId xmlns:a16="http://schemas.microsoft.com/office/drawing/2014/main" id="{2D755749-E269-4524-893E-401D9DD151B5}"/>
+                </a:ext>
+              </a:extLst>
+            </p:cNvPr>
+            <p:cNvCxnSpPr/>
+            <p:nvPr/>
+          </p:nvCxnSpPr>
+          <p:spPr>
+            <a:xfrm>
+              <a:off x="614149" y="4908471"/>
+              <a:ext cx="484693" cy="0"/>
+            </a:xfrm>
+            <a:prstGeom prst="straightConnector1">
+              <a:avLst/>
+            </a:prstGeom>
+            <a:ln w="28575">
+              <a:solidFill>
+                <a:srgbClr val="0070C0"/>
+              </a:solidFill>
+              <a:tailEnd type="arrow"/>
+            </a:ln>
+          </p:spPr>
+          <p:style>
+            <a:lnRef idx="1">
+              <a:schemeClr val="accent1"/>
+            </a:lnRef>
+            <a:fillRef idx="0">
+              <a:schemeClr val="accent1"/>
+            </a:fillRef>
+            <a:effectRef idx="0">
+              <a:schemeClr val="accent1"/>
+            </a:effectRef>
+            <a:fontRef idx="minor">
+              <a:schemeClr val="tx1"/>
+            </a:fontRef>
+          </p:style>
+        </p:cxnSp>
+      </p:grpSp>
+      <p:sp>
+        <p:nvSpPr>
+          <p:cNvPr id="102" name="CasellaDiTesto 101">
+            <a:extLst>
+              <a:ext uri="{FF2B5EF4-FFF2-40B4-BE49-F238E27FC236}">
+                <a16:creationId xmlns:a16="http://schemas.microsoft.com/office/drawing/2014/main" id="{8DC4072B-AA57-45FE-8495-40605C79F3BA}"/>
+              </a:ext>
+            </a:extLst>
+          </p:cNvPr>
+          <p:cNvSpPr txBox="1"/>
+          <p:nvPr/>
+        </p:nvSpPr>
+        <p:spPr>
+          <a:xfrm>
+            <a:off x="6754056" y="4624059"/>
+            <a:ext cx="1230479" cy="523220"/>
+          </a:xfrm>
+          <a:prstGeom prst="rect">
+            <a:avLst/>
+          </a:prstGeom>
+          <a:noFill/>
+        </p:spPr>
+        <p:txBody>
+          <a:bodyPr wrap="square">
+            <a:spAutoFit/>
+          </a:bodyPr>
+          <a:lstStyle/>
+          <a:p>
+            <a:r>
+              <a:rPr lang="en-US" sz="1400" b="1" dirty="0"/>
+              <a:t>Update (</a:t>
+            </a:r>
+            <a:r>
+              <a:rPr lang="en-US" sz="1400" b="1" dirty="0">
+                <a:solidFill>
+                  <a:srgbClr val="0070C0"/>
+                </a:solidFill>
+              </a:rPr>
+              <a:t>comments</a:t>
+            </a:r>
+            <a:r>
+              <a:rPr lang="en-US" sz="1400" b="1" dirty="0"/>
+              <a:t>)</a:t>
+            </a:r>
+            <a:endParaRPr lang="en-US" sz="1400" dirty="0"/>
+          </a:p>
+        </p:txBody>
+      </p:sp>
     </p:spTree>
     <p:extLst>
       <p:ext uri="{BB962C8B-B14F-4D97-AF65-F5344CB8AC3E}">
@@ -22775,58 +23345,49 @@
           </a:p>
           <a:p>
             <a:r>
+              <a:rPr lang="en-US" sz="1600" dirty="0"/>
+              <a:t>AlbumId </a:t>
+            </a:r>
+            <a:r>
               <a:rPr lang="en-US" sz="1600" dirty="0">
+                <a:sym typeface="Wingdings" panose="05000000000000000000" pitchFamily="2" charset="2"/>
+              </a:rPr>
+              <a:t> </a:t>
+            </a:r>
+            <a:r>
+              <a:rPr lang="en-US" sz="1600" b="1" dirty="0">
                 <a:solidFill>
                   <a:srgbClr val="FF0000"/>
                 </a:solidFill>
-              </a:rPr>
-              <a:t>AlbumId </a:t>
+                <a:sym typeface="Wingdings" panose="05000000000000000000" pitchFamily="2" charset="2"/>
+              </a:rPr>
+              <a:t>alId</a:t>
+            </a:r>
+          </a:p>
+          <a:p>
+            <a:r>
+              <a:rPr lang="it-IT" sz="1600" dirty="0"/>
+              <a:t>nextImages</a:t>
+            </a:r>
+            <a:r>
+              <a:rPr lang="en-US" sz="1600" dirty="0"/>
+              <a:t> </a:t>
             </a:r>
             <a:r>
               <a:rPr lang="en-US" sz="1600" dirty="0">
+                <a:sym typeface="Wingdings" panose="05000000000000000000" pitchFamily="2" charset="2"/>
+              </a:rPr>
+              <a:t> </a:t>
+            </a:r>
+            <a:r>
+              <a:rPr lang="it-IT" sz="1600" b="1" dirty="0">
                 <a:solidFill>
                   <a:srgbClr val="FF0000"/>
                 </a:solidFill>
-                <a:sym typeface="Wingdings" panose="05000000000000000000" pitchFamily="2" charset="2"/>
-              </a:rPr>
-              <a:t> alId</a:t>
-            </a:r>
-          </a:p>
-          <a:p>
-            <a:r>
-              <a:rPr lang="it-IT" sz="1600" dirty="0">
-                <a:solidFill>
-                  <a:srgbClr val="FF0000"/>
-                </a:solidFill>
-              </a:rPr>
-              <a:t>nextImages</a:t>
-            </a:r>
-            <a:r>
-              <a:rPr lang="en-US" sz="1600" dirty="0">
-                <a:solidFill>
-                  <a:srgbClr val="FF0000"/>
-                </a:solidFill>
-              </a:rPr>
-              <a:t> </a:t>
-            </a:r>
-            <a:r>
-              <a:rPr lang="en-US" sz="1600" dirty="0">
-                <a:solidFill>
-                  <a:srgbClr val="FF0000"/>
-                </a:solidFill>
-                <a:sym typeface="Wingdings" panose="05000000000000000000" pitchFamily="2" charset="2"/>
-              </a:rPr>
-              <a:t> </a:t>
-            </a:r>
-            <a:r>
-              <a:rPr lang="it-IT" sz="1600" dirty="0">
-                <a:solidFill>
-                  <a:srgbClr val="FF0000"/>
-                </a:solidFill>
               </a:rPr>
               <a:t>urlNextImages</a:t>
             </a:r>
-            <a:endParaRPr lang="en-US" sz="1600" dirty="0">
+            <a:endParaRPr lang="en-US" sz="1600" b="1" dirty="0">
               <a:solidFill>
                 <a:srgbClr val="FF0000"/>
               </a:solidFill>
@@ -22835,39 +23396,28 @@
           </a:p>
           <a:p>
             <a:r>
-              <a:rPr lang="it-IT" sz="1600" dirty="0">
+              <a:rPr lang="it-IT" sz="1600" dirty="0"/>
+              <a:t>previousImages</a:t>
+            </a:r>
+            <a:r>
+              <a:rPr lang="en-US" sz="1600" dirty="0"/>
+              <a:t> </a:t>
+            </a:r>
+            <a:r>
+              <a:rPr lang="en-US" sz="1600" dirty="0">
+                <a:sym typeface="Wingdings" panose="05000000000000000000" pitchFamily="2" charset="2"/>
+              </a:rPr>
+              <a:t> </a:t>
+            </a:r>
+            <a:r>
+              <a:rPr lang="it-IT" sz="1600" b="1" dirty="0">
                 <a:solidFill>
                   <a:srgbClr val="FF0000"/>
                 </a:solidFill>
               </a:rPr>
-              <a:t>previousImages</a:t>
-            </a:r>
-            <a:r>
-              <a:rPr lang="en-US" sz="1600" dirty="0">
-                <a:solidFill>
-                  <a:srgbClr val="FF0000"/>
-                </a:solidFill>
-              </a:rPr>
-              <a:t> </a:t>
-            </a:r>
-            <a:r>
-              <a:rPr lang="en-US" sz="1600" dirty="0">
-                <a:solidFill>
-                  <a:srgbClr val="FF0000"/>
-                </a:solidFill>
-                <a:sym typeface="Wingdings" panose="05000000000000000000" pitchFamily="2" charset="2"/>
-              </a:rPr>
-              <a:t> </a:t>
-            </a:r>
-            <a:r>
-              <a:rPr lang="it-IT" sz="1600" dirty="0">
-                <a:solidFill>
-                  <a:srgbClr val="FF0000"/>
-                </a:solidFill>
-              </a:rPr>
               <a:t>urlPreviousImages</a:t>
             </a:r>
-            <a:endParaRPr lang="en-US" sz="1600" dirty="0">
+            <a:endParaRPr lang="en-US" sz="1600" b="1" dirty="0">
               <a:solidFill>
                 <a:srgbClr val="FF0000"/>
               </a:solidFill>
@@ -22919,31 +23469,47 @@
               <a:t>/GetImagesOfAlbum?albumId=</a:t>
             </a:r>
             <a:r>
+              <a:rPr lang="it-IT" sz="1600" b="1" dirty="0">
+                <a:solidFill>
+                  <a:srgbClr val="FF0000"/>
+                </a:solidFill>
+              </a:rPr>
+              <a:t>alId</a:t>
+            </a:r>
+            <a:r>
               <a:rPr lang="it-IT" sz="1600" dirty="0">
                 <a:solidFill>
                   <a:srgbClr val="FF0000"/>
                 </a:solidFill>
               </a:rPr>
-              <a:t>alId </a:t>
+              <a:t> </a:t>
             </a:r>
             <a:r>
               <a:rPr lang="it-IT" sz="1600" dirty="0"/>
               <a:t>&amp;nextImages= </a:t>
             </a:r>
             <a:r>
+              <a:rPr lang="it-IT" sz="1600" b="1" dirty="0">
+                <a:solidFill>
+                  <a:srgbClr val="FF0000"/>
+                </a:solidFill>
+              </a:rPr>
+              <a:t>urlNextImages</a:t>
+            </a:r>
+            <a:r>
               <a:rPr lang="it-IT" sz="1600" dirty="0">
                 <a:solidFill>
                   <a:srgbClr val="FF0000"/>
                 </a:solidFill>
               </a:rPr>
-              <a:t>urlNextImages </a:t>
+              <a:t> </a:t>
             </a:r>
             <a:r>
               <a:rPr lang="it-IT" sz="1600" dirty="0"/>
               <a:t>&amp;previousImages=</a:t>
             </a:r>
             <a:r>
-              <a:rPr lang="it-IT" sz="1600" dirty="0">
+              <a:rPr lang="it-IT" sz="1600" b="1" dirty="0">
                 <a:solidFill>
                   <a:srgbClr val="FF0000"/>
                 </a:solidFill>
@@ -23009,7 +23575,7 @@
           <a:p>
             <a:pPr algn="l"/>
             <a:r>
-              <a:rPr lang="it-IT" sz="1600" dirty="0">
+              <a:rPr lang="it-IT" sz="1600" b="1" dirty="0">
                 <a:solidFill>
                   <a:srgbClr val="FF0000"/>
                 </a:solidFill>
@@ -23024,7 +23590,7 @@
           <a:p>
             <a:pPr algn="l"/>
             <a:r>
-              <a:rPr lang="it-IT" sz="1600" dirty="0">
+              <a:rPr lang="it-IT" sz="1600" b="1" dirty="0">
                 <a:solidFill>
                   <a:srgbClr val="FF0000"/>
                 </a:solidFill>

</xml_diff>